<commit_message>
update week 7 presentation
</commit_message>
<xml_diff>
--- a/infrastructure-week-12.pptx
+++ b/infrastructure-week-12.pptx
@@ -3123,29 +3123,37 @@
         </p:spPr>
         <p:txBody>
           <a:bodyPr>
-            <a:normAutofit fontScale="90000"/>
+            <a:normAutofit/>
           </a:bodyPr>
           <a:lstStyle/>
           <a:p>
             <a:r>
-              <a:rPr lang="en-US" sz="6000" dirty="0" smtClean="0"/>
+              <a:rPr lang="en-US" sz="3600" dirty="0" err="1"/>
+              <a:t>DevOps</a:t>
+            </a:r>
+            <a:r>
+              <a:rPr lang="en-US" sz="3600" dirty="0"/>
+              <a:t> &amp; Cloud Infrastructure</a:t>
+            </a:r>
+            <a:br>
+              <a:rPr lang="en-US" sz="3600" dirty="0"/>
+            </a:br>
+            <a:r>
+              <a:rPr lang="en-US" sz="3600" dirty="0"/>
               <a:t>SEIS 6XX</a:t>
             </a:r>
             <a:br>
-              <a:rPr lang="en-US" sz="6000" dirty="0" smtClean="0"/>
+              <a:rPr lang="en-US" sz="3600" dirty="0"/>
             </a:br>
             <a:r>
-              <a:rPr lang="en-US" sz="6000" dirty="0" smtClean="0"/>
-              <a:t>IT Infrastructure</a:t>
-            </a:r>
-            <a:br>
-              <a:rPr lang="en-US" sz="6000" dirty="0" smtClean="0"/>
-            </a:br>
-            <a:r>
-              <a:rPr lang="en-US" sz="6000" dirty="0" smtClean="0"/>
-              <a:t>Week 12</a:t>
-            </a:r>
-            <a:endParaRPr lang="en-US" sz="6000" dirty="0"/>
+              <a:rPr lang="en-US" sz="3600" dirty="0"/>
+              <a:t>Week </a:t>
+            </a:r>
+            <a:r>
+              <a:rPr lang="en-US" sz="3600" dirty="0" smtClean="0"/>
+              <a:t>12</a:t>
+            </a:r>
+            <a:endParaRPr lang="en-US" sz="3600" dirty="0"/>
           </a:p>
         </p:txBody>
       </p:sp>

</xml_diff>